<commit_message>
updated PCF and sIPS from some presentations
</commit_message>
<xml_diff>
--- a/Presentations/IHE_ITI_sIPS.pptx
+++ b/Presentations/IHE_ITI_sIPS.pptx
@@ -3087,7 +3087,7 @@
           <a:p>
             <a:fld id="{DA02FF78-EC84-471C-AD1C-199585AE60A4}" type="datetimeFigureOut">
               <a:rPr lang="en-US" smtClean="0"/>
-              <a:t>11/17/2023</a:t>
+              <a:t>4/5/2024</a:t>
             </a:fld>
             <a:endParaRPr lang="en-US" dirty="0"/>
           </a:p>
@@ -3638,80 +3638,7 @@
           <a:bodyPr/>
           <a:lstStyle/>
           <a:p>
-            <a:r>
-              <a:rPr lang="en-CA" dirty="0"/>
-              <a:t>John – it seems to me that there are 3 main paradigms, here: (1) direct push of IPS, (2) query/retrieve of IPS, and (3) query/retrieve of on-demand IPS.</a:t>
-            </a:r>
-          </a:p>
-          <a:p>
-            <a:r>
-              <a:rPr lang="en-CA" dirty="0"/>
-              <a:t>I’ve tried to leverage a graphical language that shows how systems play the roles of actors. </a:t>
-            </a:r>
-          </a:p>
-          <a:p>
-            <a:r>
-              <a:rPr lang="en-CA" dirty="0"/>
-              <a:t>I’m not super-happy that (to be symmetrical) I’ve had to list </a:t>
-            </a:r>
-            <a:r>
-              <a:rPr lang="en-CA" b="1" dirty="0"/>
-              <a:t>Document Repository</a:t>
-            </a:r>
-            <a:r>
-              <a:rPr lang="en-CA" dirty="0"/>
-              <a:t> twice… or that it really didn’t add anything to the “story” to list </a:t>
-            </a:r>
-            <a:r>
-              <a:rPr lang="en-CA" b="1" dirty="0"/>
-              <a:t>Document Registry</a:t>
-            </a:r>
-            <a:r>
-              <a:rPr lang="en-CA" dirty="0"/>
-              <a:t>, so I left it off. </a:t>
-            </a:r>
-          </a:p>
-          <a:p>
-            <a:r>
-              <a:rPr lang="en-CA" dirty="0"/>
-              <a:t>But… the graphic should tell a story. It’s a </a:t>
-            </a:r>
-            <a:r>
-              <a:rPr lang="en-CA" b="1" dirty="0"/>
-              <a:t>cartoon</a:t>
-            </a:r>
-            <a:r>
-              <a:rPr lang="en-CA" dirty="0"/>
-              <a:t>… not an engineering diagram..</a:t>
-            </a:r>
-          </a:p>
-          <a:p>
-            <a:r>
-              <a:rPr lang="en-CA" dirty="0"/>
-              <a:t>I don’t know if you’re planning to record a video, or give the presentation live, or what. But… in my experience… using successive slides that “tell” the story is always a help when there’s a </a:t>
-            </a:r>
-            <a:r>
-              <a:rPr lang="en-CA" b="1" dirty="0"/>
-              <a:t>LOT </a:t>
-            </a:r>
-            <a:r>
-              <a:rPr lang="en-CA" dirty="0"/>
-              <a:t>of content (as is the case, here).</a:t>
-            </a:r>
-          </a:p>
-          <a:p>
-            <a:r>
-              <a:rPr lang="en-CA" dirty="0"/>
-              <a:t>So… I’ve created a few slides (following) that can be leveraged to progressively tell the story around these workflows. It makes it all </a:t>
-            </a:r>
-            <a:r>
-              <a:rPr lang="en-CA" b="1" i="1" dirty="0"/>
-              <a:t>seem </a:t>
-            </a:r>
-            <a:r>
-              <a:rPr lang="en-CA" dirty="0"/>
-              <a:t>less busy and confusing…</a:t>
-            </a:r>
+            <a:endParaRPr lang="en-CA" dirty="0"/>
           </a:p>
         </p:txBody>
       </p:sp>
@@ -5483,7 +5410,7 @@
           <a:p>
             <a:fld id="{5F238D36-661C-481C-ADF8-3F80DD241742}" type="datetimeFigureOut">
               <a:rPr lang="en-US" smtClean="0"/>
-              <a:t>11/17/2023</a:t>
+              <a:t>4/5/2024</a:t>
             </a:fld>
             <a:endParaRPr lang="en-US" dirty="0"/>
           </a:p>
@@ -5681,7 +5608,7 @@
           <a:p>
             <a:fld id="{5F238D36-661C-481C-ADF8-3F80DD241742}" type="datetimeFigureOut">
               <a:rPr lang="en-US" smtClean="0"/>
-              <a:t>11/17/2023</a:t>
+              <a:t>4/5/2024</a:t>
             </a:fld>
             <a:endParaRPr lang="en-US" dirty="0"/>
           </a:p>
@@ -5889,7 +5816,7 @@
           <a:p>
             <a:fld id="{5F238D36-661C-481C-ADF8-3F80DD241742}" type="datetimeFigureOut">
               <a:rPr lang="en-US" smtClean="0"/>
-              <a:t>11/17/2023</a:t>
+              <a:t>4/5/2024</a:t>
             </a:fld>
             <a:endParaRPr lang="en-US" dirty="0"/>
           </a:p>
@@ -8275,7 +8202,7 @@
           <a:p>
             <a:fld id="{5F238D36-661C-481C-ADF8-3F80DD241742}" type="datetimeFigureOut">
               <a:rPr lang="en-US" smtClean="0"/>
-              <a:t>11/17/2023</a:t>
+              <a:t>4/5/2024</a:t>
             </a:fld>
             <a:endParaRPr lang="en-US" dirty="0"/>
           </a:p>
@@ -9356,7 +9283,7 @@
             <a:fld id="{B5FB3126-25FB-F241-9D08-EF0C3CBFF311}" type="datetimeFigureOut">
               <a:rPr lang="en-US" smtClean="0"/>
               <a:pPr/>
-              <a:t>11/17/2023</a:t>
+              <a:t>4/5/2024</a:t>
             </a:fld>
             <a:endParaRPr lang="en-US" dirty="0"/>
           </a:p>
@@ -10656,7 +10583,7 @@
           <a:p>
             <a:fld id="{5F238D36-661C-481C-ADF8-3F80DD241742}" type="datetimeFigureOut">
               <a:rPr lang="en-US" smtClean="0"/>
-              <a:t>11/17/2023</a:t>
+              <a:t>4/5/2024</a:t>
             </a:fld>
             <a:endParaRPr lang="en-US" dirty="0"/>
           </a:p>
@@ -12723,7 +12650,7 @@
             <a:fld id="{B5FB3126-25FB-F241-9D08-EF0C3CBFF311}" type="datetimeFigureOut">
               <a:rPr lang="en-US" smtClean="0"/>
               <a:pPr/>
-              <a:t>11/17/2023</a:t>
+              <a:t>4/5/2024</a:t>
             </a:fld>
             <a:endParaRPr lang="en-US" dirty="0"/>
           </a:p>
@@ -14318,7 +14245,7 @@
           <a:p>
             <a:fld id="{5F238D36-661C-481C-ADF8-3F80DD241742}" type="datetimeFigureOut">
               <a:rPr lang="en-US" smtClean="0"/>
-              <a:t>11/17/2023</a:t>
+              <a:t>4/5/2024</a:t>
             </a:fld>
             <a:endParaRPr lang="en-US" dirty="0"/>
           </a:p>
@@ -14917,7 +14844,7 @@
           <a:p>
             <a:fld id="{5F238D36-661C-481C-ADF8-3F80DD241742}" type="datetimeFigureOut">
               <a:rPr lang="en-US" smtClean="0"/>
-              <a:t>11/17/2023</a:t>
+              <a:t>4/5/2024</a:t>
             </a:fld>
             <a:endParaRPr lang="en-US" dirty="0"/>
           </a:p>
@@ -15058,7 +14985,7 @@
           <a:p>
             <a:fld id="{5F238D36-661C-481C-ADF8-3F80DD241742}" type="datetimeFigureOut">
               <a:rPr lang="en-US" smtClean="0"/>
-              <a:t>11/17/2023</a:t>
+              <a:t>4/5/2024</a:t>
             </a:fld>
             <a:endParaRPr lang="en-US" dirty="0"/>
           </a:p>
@@ -15171,7 +15098,7 @@
           <a:p>
             <a:fld id="{5F238D36-661C-481C-ADF8-3F80DD241742}" type="datetimeFigureOut">
               <a:rPr lang="en-US" smtClean="0"/>
-              <a:t>11/17/2023</a:t>
+              <a:t>4/5/2024</a:t>
             </a:fld>
             <a:endParaRPr lang="en-US" dirty="0"/>
           </a:p>
@@ -15482,7 +15409,7 @@
           <a:p>
             <a:fld id="{5F238D36-661C-481C-ADF8-3F80DD241742}" type="datetimeFigureOut">
               <a:rPr lang="en-US" smtClean="0"/>
-              <a:t>11/17/2023</a:t>
+              <a:t>4/5/2024</a:t>
             </a:fld>
             <a:endParaRPr lang="en-US" dirty="0"/>
           </a:p>
@@ -15770,7 +15697,7 @@
           <a:p>
             <a:fld id="{5F238D36-661C-481C-ADF8-3F80DD241742}" type="datetimeFigureOut">
               <a:rPr lang="en-US" smtClean="0"/>
-              <a:t>11/17/2023</a:t>
+              <a:t>4/5/2024</a:t>
             </a:fld>
             <a:endParaRPr lang="en-US" dirty="0"/>
           </a:p>
@@ -16011,7 +15938,7 @@
           <a:p>
             <a:fld id="{5F238D36-661C-481C-ADF8-3F80DD241742}" type="datetimeFigureOut">
               <a:rPr lang="en-US" smtClean="0"/>
-              <a:t>11/17/2023</a:t>
+              <a:t>4/5/2024</a:t>
             </a:fld>
             <a:endParaRPr lang="en-US" dirty="0"/>
           </a:p>
@@ -38920,11 +38847,11 @@
   <p:clrMapOvr>
     <a:masterClrMapping/>
   </p:clrMapOvr>
-  <mc:AlternateContent xmlns:mc="http://schemas.openxmlformats.org/markup-compatibility/2006">
-    <mc:Choice xmlns:p14="http://schemas.microsoft.com/office/powerpoint/2010/main" Requires="p14">
+  <mc:AlternateContent xmlns:mc="http://schemas.openxmlformats.org/markup-compatibility/2006" xmlns:p14="http://schemas.microsoft.com/office/powerpoint/2010/main">
+    <mc:Choice Requires="p14">
       <p:transition p14:dur="10"/>
     </mc:Choice>
-    <mc:Fallback>
+    <mc:Fallback xmlns="">
       <p:transition/>
     </mc:Fallback>
   </mc:AlternateContent>

</xml_diff>